<commit_message>
Mods on presentation - ilasp part
</commit_message>
<xml_diff>
--- a/ATAI_Presentation ILASP.pptx
+++ b/ATAI_Presentation ILASP.pptx
@@ -1898,15 +1898,7 @@
           </a:pPr>
           <a:r>
             <a:rPr lang="en-US" dirty="0"/>
-            <a:t>It enables learning programs containing normal rules, choice rules and hard constraints, specifying (as always) background knowledge, search space and positive </a:t>
-          </a:r>
-          <a:r>
-            <a:rPr lang="en-US"/>
-            <a:t>+ negative examples</a:t>
-          </a:r>
-          <a:r>
-            <a:rPr lang="en-US" dirty="0"/>
-            <a:t>.</a:t>
+            <a:t>It enables learning programs containing normal rules, choice rules and hard constraints, specifying (as always) background knowledge, search space and positive + negative examples.</a:t>
           </a:r>
         </a:p>
       </dgm:t>
@@ -2699,15 +2691,7 @@
           </a:pPr>
           <a:r>
             <a:rPr lang="en-US" sz="1100" kern="1200" dirty="0"/>
-            <a:t>It enables learning programs containing normal rules, choice rules and hard constraints, specifying (as always) background knowledge, search space and positive </a:t>
-          </a:r>
-          <a:r>
-            <a:rPr lang="en-US" sz="1100" kern="1200"/>
-            <a:t>+ negative examples</a:t>
-          </a:r>
-          <a:r>
-            <a:rPr lang="en-US" sz="1100" kern="1200" dirty="0"/>
-            <a:t>.</a:t>
+            <a:t>It enables learning programs containing normal rules, choice rules and hard constraints, specifying (as always) background knowledge, search space and positive + negative examples.</a:t>
           </a:r>
         </a:p>
       </dsp:txBody>
@@ -5793,7 +5777,7 @@
           <a:p>
             <a:fld id="{0FB1A7F6-0812-4A46-B0B3-17E31A6CF280}" type="datetimeFigureOut">
               <a:rPr lang="it-IT" smtClean="0"/>
-              <a:t>03/07/2021</a:t>
+              <a:t>04/07/2021</a:t>
             </a:fld>
             <a:endParaRPr lang="it-IT"/>
           </a:p>
@@ -6021,7 +6005,7 @@
           <a:p>
             <a:fld id="{0FB1A7F6-0812-4A46-B0B3-17E31A6CF280}" type="datetimeFigureOut">
               <a:rPr lang="it-IT" smtClean="0"/>
-              <a:t>03/07/2021</a:t>
+              <a:t>04/07/2021</a:t>
             </a:fld>
             <a:endParaRPr lang="it-IT"/>
           </a:p>
@@ -6201,7 +6185,7 @@
           <a:p>
             <a:fld id="{0FB1A7F6-0812-4A46-B0B3-17E31A6CF280}" type="datetimeFigureOut">
               <a:rPr lang="it-IT" smtClean="0"/>
-              <a:t>03/07/2021</a:t>
+              <a:t>04/07/2021</a:t>
             </a:fld>
             <a:endParaRPr lang="it-IT"/>
           </a:p>
@@ -6371,7 +6355,7 @@
           <a:p>
             <a:fld id="{0FB1A7F6-0812-4A46-B0B3-17E31A6CF280}" type="datetimeFigureOut">
               <a:rPr lang="it-IT" smtClean="0"/>
-              <a:t>03/07/2021</a:t>
+              <a:t>04/07/2021</a:t>
             </a:fld>
             <a:endParaRPr lang="it-IT"/>
           </a:p>
@@ -6625,7 +6609,7 @@
           <a:p>
             <a:fld id="{0FB1A7F6-0812-4A46-B0B3-17E31A6CF280}" type="datetimeFigureOut">
               <a:rPr lang="it-IT" smtClean="0"/>
-              <a:t>03/07/2021</a:t>
+              <a:t>04/07/2021</a:t>
             </a:fld>
             <a:endParaRPr lang="it-IT"/>
           </a:p>
@@ -6951,7 +6935,7 @@
           <a:p>
             <a:fld id="{0FB1A7F6-0812-4A46-B0B3-17E31A6CF280}" type="datetimeFigureOut">
               <a:rPr lang="it-IT" smtClean="0"/>
-              <a:t>03/07/2021</a:t>
+              <a:t>04/07/2021</a:t>
             </a:fld>
             <a:endParaRPr lang="it-IT"/>
           </a:p>
@@ -7402,7 +7386,7 @@
           <a:p>
             <a:fld id="{0FB1A7F6-0812-4A46-B0B3-17E31A6CF280}" type="datetimeFigureOut">
               <a:rPr lang="it-IT" smtClean="0"/>
-              <a:t>03/07/2021</a:t>
+              <a:t>04/07/2021</a:t>
             </a:fld>
             <a:endParaRPr lang="it-IT"/>
           </a:p>
@@ -7520,7 +7504,7 @@
           <a:p>
             <a:fld id="{0FB1A7F6-0812-4A46-B0B3-17E31A6CF280}" type="datetimeFigureOut">
               <a:rPr lang="it-IT" smtClean="0"/>
-              <a:t>03/07/2021</a:t>
+              <a:t>04/07/2021</a:t>
             </a:fld>
             <a:endParaRPr lang="it-IT"/>
           </a:p>
@@ -7615,7 +7599,7 @@
           <a:p>
             <a:fld id="{0FB1A7F6-0812-4A46-B0B3-17E31A6CF280}" type="datetimeFigureOut">
               <a:rPr lang="it-IT" smtClean="0"/>
-              <a:t>03/07/2021</a:t>
+              <a:t>04/07/2021</a:t>
             </a:fld>
             <a:endParaRPr lang="it-IT"/>
           </a:p>
@@ -7902,7 +7886,7 @@
           <a:p>
             <a:fld id="{0FB1A7F6-0812-4A46-B0B3-17E31A6CF280}" type="datetimeFigureOut">
               <a:rPr lang="it-IT" smtClean="0"/>
-              <a:t>03/07/2021</a:t>
+              <a:t>04/07/2021</a:t>
             </a:fld>
             <a:endParaRPr lang="it-IT"/>
           </a:p>
@@ -8224,7 +8208,7 @@
           <a:p>
             <a:fld id="{0FB1A7F6-0812-4A46-B0B3-17E31A6CF280}" type="datetimeFigureOut">
               <a:rPr lang="it-IT" smtClean="0"/>
-              <a:t>03/07/2021</a:t>
+              <a:t>04/07/2021</a:t>
             </a:fld>
             <a:endParaRPr lang="it-IT"/>
           </a:p>
@@ -8478,7 +8462,7 @@
           <a:p>
             <a:fld id="{0FB1A7F6-0812-4A46-B0B3-17E31A6CF280}" type="datetimeFigureOut">
               <a:rPr lang="it-IT" smtClean="0"/>
-              <a:t>03/07/2021</a:t>
+              <a:t>04/07/2021</a:t>
             </a:fld>
             <a:endParaRPr lang="it-IT"/>
           </a:p>
@@ -12602,7 +12586,7 @@
         </p:spPr>
         <p:txBody>
           <a:bodyPr>
-            <a:normAutofit/>
+            <a:normAutofit lnSpcReduction="10000"/>
           </a:bodyPr>
           <a:lstStyle/>
           <a:p>
@@ -13131,15 +13115,7 @@
             </a:r>
             <a:r>
               <a:rPr lang="it-IT" i="1" dirty="0"/>
-              <a:t>h1...</a:t>
-            </a:r>
-            <a:r>
-              <a:rPr lang="it-IT" i="1" dirty="0" err="1"/>
-              <a:t>hn</a:t>
-            </a:r>
-            <a:r>
-              <a:rPr lang="it-IT" i="1" dirty="0"/>
-              <a:t>  </a:t>
+              <a:t>h1...hm  </a:t>
             </a:r>
             <a:r>
               <a:rPr lang="it-IT" dirty="0"/>
@@ -13614,7 +13590,7 @@
         </p:spPr>
         <p:txBody>
           <a:bodyPr>
-            <a:normAutofit/>
+            <a:normAutofit lnSpcReduction="10000"/>
           </a:bodyPr>
           <a:lstStyle/>
           <a:p>
@@ -13684,10 +13660,18 @@
             </a:r>
             <a:r>
               <a:rPr lang="it-IT" sz="1300" dirty="0"/>
-              <a:t>. (Predicate </a:t>
+              <a:t>. (</a:t>
             </a:r>
             <a:r>
               <a:rPr lang="it-IT" sz="1300" dirty="0" err="1"/>
+              <a:t>namely</a:t>
+            </a:r>
+            <a:r>
+              <a:rPr lang="it-IT" sz="1300" dirty="0"/>
+              <a:t>, Predicate </a:t>
+            </a:r>
+            <a:r>
+              <a:rPr lang="it-IT" sz="1300" b="1" dirty="0" err="1"/>
               <a:t>next</a:t>
             </a:r>
             <a:r>
@@ -13713,7 +13697,7 @@
             </a:r>
             <a:r>
               <a:rPr lang="it-IT" sz="1300" dirty="0"/>
-              <a:t>((X,Y), (Z,K)) </a:t>
+              <a:t>((X1,Y1), (X2,Y2)) </a:t>
             </a:r>
             <a:r>
               <a:rPr lang="it-IT" sz="1300" dirty="0" err="1"/>
@@ -13766,31 +13750,32 @@
             </a:r>
             <a:r>
               <a:rPr lang="it-IT" sz="1300" dirty="0"/>
-              <a:t>» predicate, = predicate </a:t>
+              <a:t>» predicate, = </a:t>
             </a:r>
             <a:r>
               <a:rPr lang="it-IT" sz="1300" dirty="0" err="1"/>
-              <a:t>true</a:t>
+              <a:t>holds</a:t>
             </a:r>
             <a:r>
               <a:rPr lang="it-IT" sz="1300" dirty="0"/>
-              <a:t> for </a:t>
+              <a:t> for consecutive </a:t>
             </a:r>
             <a:r>
               <a:rPr lang="it-IT" sz="1300" dirty="0" err="1"/>
-              <a:t>adjacent</a:t>
+              <a:t>numbers</a:t>
             </a:r>
             <a:r>
               <a:rPr lang="it-IT" sz="1300" dirty="0"/>
-              <a:t> </a:t>
-            </a:r>
-            <a:r>
-              <a:rPr lang="it-IT" sz="1300" dirty="0" err="1"/>
-              <a:t>cells</a:t>
-            </a:r>
+              <a:t>. </a:t>
+            </a:r>
+          </a:p>
+          <a:p>
+            <a:pPr marL="274320" lvl="1" indent="0">
+              <a:buNone/>
+            </a:pPr>
             <a:r>
               <a:rPr lang="it-IT" sz="1300" dirty="0"/>
-              <a:t>. «</a:t>
+              <a:t>    «</a:t>
             </a:r>
             <a:r>
               <a:rPr lang="it-IT" sz="1300" dirty="0" err="1"/>
@@ -13798,11 +13783,11 @@
             </a:r>
             <a:r>
               <a:rPr lang="it-IT" sz="1300" dirty="0"/>
-              <a:t>» predicate,  = predicate </a:t>
+              <a:t>» predicate,  = </a:t>
             </a:r>
             <a:r>
               <a:rPr lang="it-IT" sz="1300" dirty="0" err="1"/>
-              <a:t>true</a:t>
+              <a:t>hold</a:t>
             </a:r>
             <a:r>
               <a:rPr lang="it-IT" sz="1300" dirty="0"/>
@@ -14886,7 +14871,7 @@
         </p:spPr>
         <p:txBody>
           <a:bodyPr>
-            <a:normAutofit lnSpcReduction="10000"/>
+            <a:normAutofit/>
           </a:bodyPr>
           <a:lstStyle/>
           <a:p>
@@ -14975,7 +14960,7 @@
               <a:t> (Predicate </a:t>
             </a:r>
             <a:r>
-              <a:rPr lang="it-IT" sz="1300" dirty="0" err="1"/>
+              <a:rPr lang="it-IT" sz="1300" b="1" dirty="0" err="1"/>
               <a:t>nextLegit</a:t>
             </a:r>
             <a:r>
@@ -15001,7 +14986,7 @@
             </a:r>
             <a:r>
               <a:rPr lang="it-IT" sz="1300" dirty="0"/>
-              <a:t>((X,Y), (Z,K)) </a:t>
+              <a:t>((X1,Y1), (X2,Y2)) </a:t>
             </a:r>
             <a:r>
               <a:rPr lang="it-IT" sz="1300" dirty="0" err="1"/>
@@ -15078,19 +15063,27 @@
             </a:r>
             <a:r>
               <a:rPr lang="it-IT" sz="1300" dirty="0"/>
-              <a:t>» predicate, = predicate </a:t>
+              <a:t>» and «</a:t>
             </a:r>
             <a:r>
               <a:rPr lang="it-IT" sz="1300" dirty="0" err="1"/>
-              <a:t>true</a:t>
+              <a:t>cell</a:t>
             </a:r>
             <a:r>
               <a:rPr lang="it-IT" sz="1300" dirty="0"/>
-              <a:t> for </a:t>
+              <a:t>» </a:t>
             </a:r>
             <a:r>
               <a:rPr lang="it-IT" sz="1300" dirty="0" err="1"/>
-              <a:t>adjacent</a:t>
+              <a:t>predicates</a:t>
+            </a:r>
+            <a:r>
+              <a:rPr lang="it-IT" sz="1300" dirty="0"/>
+              <a:t>, </a:t>
+            </a:r>
+            <a:r>
+              <a:rPr lang="it-IT" sz="1300" dirty="0" err="1"/>
+              <a:t>as</a:t>
             </a:r>
             <a:r>
               <a:rPr lang="it-IT" sz="1300" dirty="0"/>
@@ -15098,44 +15091,9 @@
             </a:r>
             <a:r>
               <a:rPr lang="it-IT" sz="1300" dirty="0" err="1"/>
-              <a:t>cells</a:t>
-            </a:r>
-            <a:r>
-              <a:rPr lang="it-IT" sz="1300" dirty="0"/>
-              <a:t>. «</a:t>
-            </a:r>
-            <a:r>
-              <a:rPr lang="it-IT" sz="1300" dirty="0" err="1"/>
-              <a:t>cell</a:t>
-            </a:r>
-            <a:r>
-              <a:rPr lang="it-IT" sz="1300" dirty="0"/>
-              <a:t>» predicate,  = predicate </a:t>
-            </a:r>
-            <a:r>
-              <a:rPr lang="it-IT" sz="1300" dirty="0" err="1"/>
-              <a:t>true</a:t>
-            </a:r>
-            <a:r>
-              <a:rPr lang="it-IT" sz="1300" dirty="0"/>
-              <a:t> for </a:t>
-            </a:r>
-            <a:r>
-              <a:rPr lang="it-IT" sz="1300" dirty="0" err="1"/>
-              <a:t>coordinates</a:t>
-            </a:r>
-            <a:r>
-              <a:rPr lang="it-IT" sz="1300" dirty="0"/>
-              <a:t> on the </a:t>
-            </a:r>
-            <a:r>
-              <a:rPr lang="it-IT" sz="1300" dirty="0" err="1"/>
-              <a:t>grid</a:t>
-            </a:r>
-            <a:r>
-              <a:rPr lang="it-IT" sz="1300" dirty="0"/>
-              <a:t>. </a:t>
-            </a:r>
+              <a:t>previously</a:t>
+            </a:r>
+            <a:endParaRPr lang="it-IT" sz="1300" dirty="0"/>
           </a:p>
           <a:p>
             <a:pPr marL="274320" lvl="1" indent="0">
@@ -15151,7 +15109,48 @@
             </a:r>
             <a:r>
               <a:rPr lang="it-IT" sz="1300" dirty="0"/>
-              <a:t>» predicate. «</a:t>
+              <a:t>» predicate: </a:t>
+            </a:r>
+            <a:r>
+              <a:rPr lang="it-IT" sz="1300" dirty="0" err="1"/>
+              <a:t>holds</a:t>
+            </a:r>
+            <a:r>
+              <a:rPr lang="it-IT" sz="1300" dirty="0"/>
+              <a:t> </a:t>
+            </a:r>
+            <a:r>
+              <a:rPr lang="it-IT" sz="1300" dirty="0" err="1"/>
+              <a:t>when</a:t>
+            </a:r>
+            <a:r>
+              <a:rPr lang="it-IT" sz="1300" dirty="0"/>
+              <a:t> </a:t>
+            </a:r>
+            <a:r>
+              <a:rPr lang="it-IT" sz="1300" dirty="0" err="1"/>
+              <a:t>obs</a:t>
+            </a:r>
+            <a:r>
+              <a:rPr lang="it-IT" sz="1300" dirty="0"/>
+              <a:t>. </a:t>
+            </a:r>
+            <a:r>
+              <a:rPr lang="it-IT" sz="1300" dirty="0" err="1"/>
+              <a:t>is</a:t>
+            </a:r>
+            <a:r>
+              <a:rPr lang="it-IT" sz="1300" dirty="0"/>
+              <a:t> on the coordinate.</a:t>
+            </a:r>
+          </a:p>
+          <a:p>
+            <a:pPr marL="274320" lvl="1" indent="0">
+              <a:buNone/>
+            </a:pPr>
+            <a:r>
+              <a:rPr lang="it-IT" sz="1300" dirty="0"/>
+              <a:t>    «</a:t>
             </a:r>
             <a:r>
               <a:rPr lang="it-IT" sz="1300" dirty="0" err="1"/>

</xml_diff>